<commit_message>
adding content for live example
</commit_message>
<xml_diff>
--- a/cf_version_control_systems.pptx
+++ b/cf_version_control_systems.pptx
@@ -16,23 +16,26 @@
     <p:sldId id="267" r:id="rId10"/>
     <p:sldId id="259" r:id="rId11"/>
     <p:sldId id="283" r:id="rId12"/>
-    <p:sldId id="286" r:id="rId13"/>
-    <p:sldId id="289" r:id="rId14"/>
-    <p:sldId id="270" r:id="rId15"/>
-    <p:sldId id="272" r:id="rId16"/>
-    <p:sldId id="271" r:id="rId17"/>
-    <p:sldId id="269" r:id="rId18"/>
-    <p:sldId id="273" r:id="rId19"/>
-    <p:sldId id="274" r:id="rId20"/>
-    <p:sldId id="277" r:id="rId21"/>
-    <p:sldId id="275" r:id="rId22"/>
-    <p:sldId id="278" r:id="rId23"/>
-    <p:sldId id="279" r:id="rId24"/>
-    <p:sldId id="280" r:id="rId25"/>
-    <p:sldId id="282" r:id="rId26"/>
-    <p:sldId id="281" r:id="rId27"/>
-    <p:sldId id="262" r:id="rId28"/>
-    <p:sldId id="263" r:id="rId29"/>
+    <p:sldId id="293" r:id="rId13"/>
+    <p:sldId id="294" r:id="rId14"/>
+    <p:sldId id="286" r:id="rId15"/>
+    <p:sldId id="291" r:id="rId16"/>
+    <p:sldId id="292" r:id="rId17"/>
+    <p:sldId id="270" r:id="rId18"/>
+    <p:sldId id="272" r:id="rId19"/>
+    <p:sldId id="271" r:id="rId20"/>
+    <p:sldId id="269" r:id="rId21"/>
+    <p:sldId id="273" r:id="rId22"/>
+    <p:sldId id="274" r:id="rId23"/>
+    <p:sldId id="277" r:id="rId24"/>
+    <p:sldId id="275" r:id="rId25"/>
+    <p:sldId id="278" r:id="rId26"/>
+    <p:sldId id="279" r:id="rId27"/>
+    <p:sldId id="280" r:id="rId28"/>
+    <p:sldId id="282" r:id="rId29"/>
+    <p:sldId id="281" r:id="rId30"/>
+    <p:sldId id="262" r:id="rId31"/>
+    <p:sldId id="263" r:id="rId32"/>
   </p:sldIdLst>
   <p:sldSz cx="12192000" cy="6858000"/>
   <p:notesSz cx="6858000" cy="9144000"/>
@@ -5781,7 +5784,7 @@
       <dgm:spPr/>
     </dgm:pt>
     <dgm:pt modelId="{FCAA9E1E-456A-4C95-8793-3FF1704CFBDC}" type="pres">
-      <dgm:prSet presAssocID="{5F73361E-4370-4485-815D-187257F94B55}" presName="node" presStyleLbl="node1" presStyleIdx="0" presStyleCnt="1" custScaleX="47081" custScaleY="46647" custLinFactNeighborX="-3012" custLinFactNeighborY="-46657">
+      <dgm:prSet presAssocID="{5F73361E-4370-4485-815D-187257F94B55}" presName="node" presStyleLbl="node1" presStyleIdx="0" presStyleCnt="1" custScaleX="47081" custScaleY="46647" custLinFactNeighborX="-3355" custLinFactNeighborY="43863">
         <dgm:presLayoutVars>
           <dgm:bulletEnabled val="1"/>
         </dgm:presLayoutVars>
@@ -6474,7 +6477,7 @@
       </dsp:nvSpPr>
       <dsp:spPr>
         <a:xfrm>
-          <a:off x="1214955" y="3"/>
+          <a:off x="1197182" y="2814233"/>
           <a:ext cx="2439549" cy="1450236"/>
         </a:xfrm>
         <a:prstGeom prst="round1Rect">
@@ -6545,7 +6548,7 @@
         </a:p>
       </dsp:txBody>
       <dsp:txXfrm>
-        <a:off x="1214955" y="3"/>
+        <a:off x="1197182" y="2814233"/>
         <a:ext cx="2368754" cy="1450236"/>
       </dsp:txXfrm>
     </dsp:sp>
@@ -15224,7 +15227,7 @@
           <a:p>
             <a:fld id="{619E4C2F-4190-4DFC-A849-951516848FEB}" type="datetimeFigureOut">
               <a:rPr lang="de-DE" smtClean="0"/>
-              <a:t>23.08.2018</a:t>
+              <a:t>24.08.2018</a:t>
             </a:fld>
             <a:endParaRPr lang="de-DE"/>
           </a:p>
@@ -15392,7 +15395,7 @@
           <a:p>
             <a:fld id="{619E4C2F-4190-4DFC-A849-951516848FEB}" type="datetimeFigureOut">
               <a:rPr lang="de-DE" smtClean="0"/>
-              <a:t>23.08.2018</a:t>
+              <a:t>24.08.2018</a:t>
             </a:fld>
             <a:endParaRPr lang="de-DE"/>
           </a:p>
@@ -15570,7 +15573,7 @@
           <a:p>
             <a:fld id="{619E4C2F-4190-4DFC-A849-951516848FEB}" type="datetimeFigureOut">
               <a:rPr lang="de-DE" smtClean="0"/>
-              <a:t>23.08.2018</a:t>
+              <a:t>24.08.2018</a:t>
             </a:fld>
             <a:endParaRPr lang="de-DE"/>
           </a:p>
@@ -15738,7 +15741,7 @@
           <a:p>
             <a:fld id="{619E4C2F-4190-4DFC-A849-951516848FEB}" type="datetimeFigureOut">
               <a:rPr lang="de-DE" smtClean="0"/>
-              <a:t>23.08.2018</a:t>
+              <a:t>24.08.2018</a:t>
             </a:fld>
             <a:endParaRPr lang="de-DE"/>
           </a:p>
@@ -15983,7 +15986,7 @@
           <a:p>
             <a:fld id="{619E4C2F-4190-4DFC-A849-951516848FEB}" type="datetimeFigureOut">
               <a:rPr lang="de-DE" smtClean="0"/>
-              <a:t>23.08.2018</a:t>
+              <a:t>24.08.2018</a:t>
             </a:fld>
             <a:endParaRPr lang="de-DE"/>
           </a:p>
@@ -16212,7 +16215,7 @@
           <a:p>
             <a:fld id="{619E4C2F-4190-4DFC-A849-951516848FEB}" type="datetimeFigureOut">
               <a:rPr lang="de-DE" smtClean="0"/>
-              <a:t>23.08.2018</a:t>
+              <a:t>24.08.2018</a:t>
             </a:fld>
             <a:endParaRPr lang="de-DE"/>
           </a:p>
@@ -16576,7 +16579,7 @@
           <a:p>
             <a:fld id="{619E4C2F-4190-4DFC-A849-951516848FEB}" type="datetimeFigureOut">
               <a:rPr lang="de-DE" smtClean="0"/>
-              <a:t>23.08.2018</a:t>
+              <a:t>24.08.2018</a:t>
             </a:fld>
             <a:endParaRPr lang="de-DE"/>
           </a:p>
@@ -16693,7 +16696,7 @@
           <a:p>
             <a:fld id="{619E4C2F-4190-4DFC-A849-951516848FEB}" type="datetimeFigureOut">
               <a:rPr lang="de-DE" smtClean="0"/>
-              <a:t>23.08.2018</a:t>
+              <a:t>24.08.2018</a:t>
             </a:fld>
             <a:endParaRPr lang="de-DE"/>
           </a:p>
@@ -16788,7 +16791,7 @@
           <a:p>
             <a:fld id="{619E4C2F-4190-4DFC-A849-951516848FEB}" type="datetimeFigureOut">
               <a:rPr lang="de-DE" smtClean="0"/>
-              <a:t>23.08.2018</a:t>
+              <a:t>24.08.2018</a:t>
             </a:fld>
             <a:endParaRPr lang="de-DE"/>
           </a:p>
@@ -17063,7 +17066,7 @@
           <a:p>
             <a:fld id="{619E4C2F-4190-4DFC-A849-951516848FEB}" type="datetimeFigureOut">
               <a:rPr lang="de-DE" smtClean="0"/>
-              <a:t>23.08.2018</a:t>
+              <a:t>24.08.2018</a:t>
             </a:fld>
             <a:endParaRPr lang="de-DE"/>
           </a:p>
@@ -17315,7 +17318,7 @@
           <a:p>
             <a:fld id="{619E4C2F-4190-4DFC-A849-951516848FEB}" type="datetimeFigureOut">
               <a:rPr lang="de-DE" smtClean="0"/>
-              <a:t>23.08.2018</a:t>
+              <a:t>24.08.2018</a:t>
             </a:fld>
             <a:endParaRPr lang="de-DE"/>
           </a:p>
@@ -17526,7 +17529,7 @@
           <a:p>
             <a:fld id="{619E4C2F-4190-4DFC-A849-951516848FEB}" type="datetimeFigureOut">
               <a:rPr lang="de-DE" smtClean="0"/>
-              <a:t>23.08.2018</a:t>
+              <a:t>24.08.2018</a:t>
             </a:fld>
             <a:endParaRPr lang="de-DE"/>
           </a:p>
@@ -17970,7 +17973,7 @@
           <a:p>
             <a:r>
               <a:rPr lang="de-DE"/>
-              <a:t>or: How do I git well?</a:t>
+              <a:t>or: How to git better</a:t>
             </a:r>
           </a:p>
         </p:txBody>
@@ -18472,6 +18475,158 @@
       </p:grpSpPr>
       <p:sp>
         <p:nvSpPr>
+          <p:cNvPr id="4" name="Titel 3">
+            <a:extLst>
+              <a:ext uri="{FF2B5EF4-FFF2-40B4-BE49-F238E27FC236}">
+                <a16:creationId xmlns:a16="http://schemas.microsoft.com/office/drawing/2014/main" id="{FE0000AE-FA33-4805-B0B9-92B6C464BB7F}"/>
+              </a:ext>
+            </a:extLst>
+          </p:cNvPr>
+          <p:cNvSpPr>
+            <a:spLocks noGrp="1"/>
+          </p:cNvSpPr>
+          <p:nvPr>
+            <p:ph type="title"/>
+          </p:nvPr>
+        </p:nvSpPr>
+        <p:spPr/>
+        <p:txBody>
+          <a:bodyPr/>
+          <a:lstStyle/>
+          <a:p>
+            <a:r>
+              <a:rPr lang="de-DE"/>
+              <a:t>Interactive Example</a:t>
+            </a:r>
+          </a:p>
+        </p:txBody>
+      </p:sp>
+      <p:sp>
+        <p:nvSpPr>
+          <p:cNvPr id="5" name="Inhaltsplatzhalter 4">
+            <a:extLst>
+              <a:ext uri="{FF2B5EF4-FFF2-40B4-BE49-F238E27FC236}">
+                <a16:creationId xmlns:a16="http://schemas.microsoft.com/office/drawing/2014/main" id="{5B31C457-A272-4E7C-8A4F-33F4D69B42F4}"/>
+              </a:ext>
+            </a:extLst>
+          </p:cNvPr>
+          <p:cNvSpPr>
+            <a:spLocks noGrp="1"/>
+          </p:cNvSpPr>
+          <p:nvPr>
+            <p:ph idx="1"/>
+          </p:nvPr>
+        </p:nvSpPr>
+        <p:spPr/>
+        <p:txBody>
+          <a:bodyPr/>
+          <a:lstStyle/>
+          <a:p>
+            <a:r>
+              <a:rPr lang="de-DE"/>
+              <a:t>Let‘s use Microsoft PowerPoint Embedded iBash Shell</a:t>
+            </a:r>
+          </a:p>
+        </p:txBody>
+      </p:sp>
+    </p:spTree>
+    <p:extLst>
+      <p:ext uri="{BB962C8B-B14F-4D97-AF65-F5344CB8AC3E}">
+        <p14:creationId xmlns:p14="http://schemas.microsoft.com/office/powerpoint/2010/main" val="201007917"/>
+      </p:ext>
+    </p:extLst>
+  </p:cSld>
+  <p:clrMapOvr>
+    <a:masterClrMapping/>
+  </p:clrMapOvr>
+</p:sld>
+</file>
+
+<file path=ppt/slides/slide13.xml><?xml version="1.0" encoding="utf-8"?>
+<p:sld xmlns:a="http://schemas.openxmlformats.org/drawingml/2006/main" xmlns:r="http://schemas.openxmlformats.org/officeDocument/2006/relationships" xmlns:p="http://schemas.openxmlformats.org/presentationml/2006/main">
+  <p:cSld>
+    <p:spTree>
+      <p:nvGrpSpPr>
+        <p:cNvPr id="1" name=""/>
+        <p:cNvGrpSpPr/>
+        <p:nvPr/>
+      </p:nvGrpSpPr>
+      <p:grpSpPr>
+        <a:xfrm>
+          <a:off x="0" y="0"/>
+          <a:ext cx="0" cy="0"/>
+          <a:chOff x="0" y="0"/>
+          <a:chExt cx="0" cy="0"/>
+        </a:xfrm>
+      </p:grpSpPr>
+      <p:pic>
+        <p:nvPicPr>
+          <p:cNvPr id="11" name="Grafik 10">
+            <a:extLst>
+              <a:ext uri="{FF2B5EF4-FFF2-40B4-BE49-F238E27FC236}">
+                <a16:creationId xmlns:a16="http://schemas.microsoft.com/office/drawing/2014/main" id="{9094C394-F090-4D30-9EDE-4505E8267B30}"/>
+              </a:ext>
+            </a:extLst>
+          </p:cNvPr>
+          <p:cNvPicPr>
+            <a:picLocks noChangeAspect="1"/>
+          </p:cNvPicPr>
+          <p:nvPr/>
+        </p:nvPicPr>
+        <p:blipFill>
+          <a:blip r:embed="rId2">
+            <a:extLst>
+              <a:ext uri="{28A0092B-C50C-407E-A947-70E740481C1C}">
+                <a14:useLocalDpi xmlns:a14="http://schemas.microsoft.com/office/drawing/2010/main" val="0"/>
+              </a:ext>
+            </a:extLst>
+          </a:blip>
+          <a:stretch>
+            <a:fillRect/>
+          </a:stretch>
+        </p:blipFill>
+        <p:spPr>
+          <a:xfrm>
+            <a:off x="0" y="523087"/>
+            <a:ext cx="12192000" cy="5811825"/>
+          </a:xfrm>
+          <a:prstGeom prst="rect">
+            <a:avLst/>
+          </a:prstGeom>
+        </p:spPr>
+      </p:pic>
+    </p:spTree>
+    <p:extLst>
+      <p:ext uri="{BB962C8B-B14F-4D97-AF65-F5344CB8AC3E}">
+        <p14:creationId xmlns:p14="http://schemas.microsoft.com/office/powerpoint/2010/main" val="553563010"/>
+      </p:ext>
+    </p:extLst>
+  </p:cSld>
+  <p:clrMapOvr>
+    <a:masterClrMapping/>
+  </p:clrMapOvr>
+</p:sld>
+</file>
+
+<file path=ppt/slides/slide14.xml><?xml version="1.0" encoding="utf-8"?>
+<p:sld xmlns:a="http://schemas.openxmlformats.org/drawingml/2006/main" xmlns:r="http://schemas.openxmlformats.org/officeDocument/2006/relationships" xmlns:p="http://schemas.openxmlformats.org/presentationml/2006/main">
+  <p:cSld>
+    <p:spTree>
+      <p:nvGrpSpPr>
+        <p:cNvPr id="1" name=""/>
+        <p:cNvGrpSpPr/>
+        <p:nvPr/>
+      </p:nvGrpSpPr>
+      <p:grpSpPr>
+        <a:xfrm>
+          <a:off x="0" y="0"/>
+          <a:ext cx="0" cy="0"/>
+          <a:chOff x="0" y="0"/>
+          <a:chExt cx="0" cy="0"/>
+        </a:xfrm>
+      </p:grpSpPr>
+      <p:sp>
+        <p:nvSpPr>
           <p:cNvPr id="2" name="Titel 1">
             <a:extLst>
               <a:ext uri="{FF2B5EF4-FFF2-40B4-BE49-F238E27FC236}">
@@ -18539,7 +18694,7 @@
 </p:sld>
 </file>
 
-<file path=ppt/slides/slide13.xml><?xml version="1.0" encoding="utf-8"?>
+<file path=ppt/slides/slide15.xml><?xml version="1.0" encoding="utf-8"?>
 <p:sld xmlns:a="http://schemas.openxmlformats.org/drawingml/2006/main" xmlns:r="http://schemas.openxmlformats.org/officeDocument/2006/relationships" xmlns:p="http://schemas.openxmlformats.org/presentationml/2006/main">
   <p:cSld>
     <p:spTree>
@@ -18586,28 +18741,168 @@
       </p:sp>
       <p:sp>
         <p:nvSpPr>
-          <p:cNvPr id="5" name="Inhaltsplatzhalter 4">
+          <p:cNvPr id="5" name="Rechteck 4">
             <a:extLst>
               <a:ext uri="{FF2B5EF4-FFF2-40B4-BE49-F238E27FC236}">
-                <a16:creationId xmlns:a16="http://schemas.microsoft.com/office/drawing/2014/main" id="{B5826B61-B717-4E07-9F27-0D9EB96E6400}"/>
+                <a16:creationId xmlns:a16="http://schemas.microsoft.com/office/drawing/2014/main" id="{1C2F86E0-26D3-4C06-B9ED-744E9D0777C3}"/>
               </a:ext>
             </a:extLst>
           </p:cNvPr>
-          <p:cNvSpPr>
-            <a:spLocks noGrp="1"/>
-          </p:cNvSpPr>
-          <p:nvPr>
-            <p:ph idx="1"/>
-          </p:nvPr>
+          <p:cNvSpPr/>
+          <p:nvPr/>
         </p:nvSpPr>
-        <p:spPr/>
+        <p:spPr>
+          <a:xfrm>
+            <a:off x="6177342" y="1517197"/>
+            <a:ext cx="1614256" cy="903618"/>
+          </a:xfrm>
+          <a:prstGeom prst="rect">
+            <a:avLst/>
+          </a:prstGeom>
+          <a:solidFill>
+            <a:schemeClr val="bg1"/>
+          </a:solidFill>
+        </p:spPr>
+        <p:style>
+          <a:lnRef idx="2">
+            <a:schemeClr val="accent1">
+              <a:shade val="50000"/>
+            </a:schemeClr>
+          </a:lnRef>
+          <a:fillRef idx="1">
+            <a:schemeClr val="accent1"/>
+          </a:fillRef>
+          <a:effectRef idx="0">
+            <a:schemeClr val="accent1"/>
+          </a:effectRef>
+          <a:fontRef idx="minor">
+            <a:schemeClr val="lt1"/>
+          </a:fontRef>
+        </p:style>
         <p:txBody>
-          <a:bodyPr/>
+          <a:bodyPr rtlCol="0" anchor="ctr"/>
           <a:lstStyle/>
           <a:p>
+            <a:pPr algn="ctr"/>
             <a:r>
-              <a:rPr lang="de-DE"/>
-              <a:t>Insert picture of a tree here</a:t>
+              <a:rPr lang="de-DE" sz="3600">
+                <a:solidFill>
+                  <a:schemeClr val="tx1"/>
+                </a:solidFill>
+              </a:rPr>
+              <a:t>fork</a:t>
+            </a:r>
+          </a:p>
+        </p:txBody>
+      </p:sp>
+      <p:sp>
+        <p:nvSpPr>
+          <p:cNvPr id="6" name="Rechteck 5">
+            <a:extLst>
+              <a:ext uri="{FF2B5EF4-FFF2-40B4-BE49-F238E27FC236}">
+                <a16:creationId xmlns:a16="http://schemas.microsoft.com/office/drawing/2014/main" id="{085273E2-E03A-47C1-A138-728698DC3998}"/>
+              </a:ext>
+            </a:extLst>
+          </p:cNvPr>
+          <p:cNvSpPr/>
+          <p:nvPr/>
+        </p:nvSpPr>
+        <p:spPr>
+          <a:xfrm>
+            <a:off x="3292137" y="2893489"/>
+            <a:ext cx="1614256" cy="903618"/>
+          </a:xfrm>
+          <a:prstGeom prst="rect">
+            <a:avLst/>
+          </a:prstGeom>
+          <a:solidFill>
+            <a:schemeClr val="bg1"/>
+          </a:solidFill>
+        </p:spPr>
+        <p:style>
+          <a:lnRef idx="2">
+            <a:schemeClr val="accent1">
+              <a:shade val="50000"/>
+            </a:schemeClr>
+          </a:lnRef>
+          <a:fillRef idx="1">
+            <a:schemeClr val="accent1"/>
+          </a:fillRef>
+          <a:effectRef idx="0">
+            <a:schemeClr val="accent1"/>
+          </a:effectRef>
+          <a:fontRef idx="minor">
+            <a:schemeClr val="lt1"/>
+          </a:fontRef>
+        </p:style>
+        <p:txBody>
+          <a:bodyPr rtlCol="0" anchor="ctr"/>
+          <a:lstStyle/>
+          <a:p>
+            <a:pPr algn="ctr"/>
+            <a:r>
+              <a:rPr lang="de-DE" sz="3600">
+                <a:solidFill>
+                  <a:schemeClr val="tx1"/>
+                </a:solidFill>
+              </a:rPr>
+              <a:t>branch</a:t>
+            </a:r>
+          </a:p>
+        </p:txBody>
+      </p:sp>
+      <p:sp>
+        <p:nvSpPr>
+          <p:cNvPr id="7" name="Rechteck 6">
+            <a:extLst>
+              <a:ext uri="{FF2B5EF4-FFF2-40B4-BE49-F238E27FC236}">
+                <a16:creationId xmlns:a16="http://schemas.microsoft.com/office/drawing/2014/main" id="{1E6EC1A1-5E70-4123-8BAE-76633CA60034}"/>
+              </a:ext>
+            </a:extLst>
+          </p:cNvPr>
+          <p:cNvSpPr/>
+          <p:nvPr/>
+        </p:nvSpPr>
+        <p:spPr>
+          <a:xfrm>
+            <a:off x="6851343" y="5273345"/>
+            <a:ext cx="1614256" cy="903618"/>
+          </a:xfrm>
+          <a:prstGeom prst="rect">
+            <a:avLst/>
+          </a:prstGeom>
+          <a:solidFill>
+            <a:schemeClr val="bg1"/>
+          </a:solidFill>
+        </p:spPr>
+        <p:style>
+          <a:lnRef idx="2">
+            <a:schemeClr val="accent1">
+              <a:shade val="50000"/>
+            </a:schemeClr>
+          </a:lnRef>
+          <a:fillRef idx="1">
+            <a:schemeClr val="accent1"/>
+          </a:fillRef>
+          <a:effectRef idx="0">
+            <a:schemeClr val="accent1"/>
+          </a:effectRef>
+          <a:fontRef idx="minor">
+            <a:schemeClr val="lt1"/>
+          </a:fontRef>
+        </p:style>
+        <p:txBody>
+          <a:bodyPr rtlCol="0" anchor="ctr"/>
+          <a:lstStyle/>
+          <a:p>
+            <a:pPr algn="ctr"/>
+            <a:r>
+              <a:rPr lang="de-DE" sz="3600">
+                <a:solidFill>
+                  <a:schemeClr val="tx1"/>
+                </a:solidFill>
+              </a:rPr>
+              <a:t>trunk</a:t>
             </a:r>
           </a:p>
         </p:txBody>
@@ -18615,7 +18910,7 @@
     </p:spTree>
     <p:extLst>
       <p:ext uri="{BB962C8B-B14F-4D97-AF65-F5344CB8AC3E}">
-        <p14:creationId xmlns:p14="http://schemas.microsoft.com/office/powerpoint/2010/main" val="1589661164"/>
+        <p14:creationId xmlns:p14="http://schemas.microsoft.com/office/powerpoint/2010/main" val="1710158586"/>
       </p:ext>
     </p:extLst>
   </p:cSld>
@@ -18625,7 +18920,324 @@
 </p:sld>
 </file>
 
-<file path=ppt/slides/slide14.xml><?xml version="1.0" encoding="utf-8"?>
+<file path=ppt/slides/slide16.xml><?xml version="1.0" encoding="utf-8"?>
+<p:sld xmlns:a="http://schemas.openxmlformats.org/drawingml/2006/main" xmlns:r="http://schemas.openxmlformats.org/officeDocument/2006/relationships" xmlns:p="http://schemas.openxmlformats.org/presentationml/2006/main">
+  <p:cSld>
+    <p:spTree>
+      <p:nvGrpSpPr>
+        <p:cNvPr id="1" name=""/>
+        <p:cNvGrpSpPr/>
+        <p:nvPr/>
+      </p:nvGrpSpPr>
+      <p:grpSpPr>
+        <a:xfrm>
+          <a:off x="0" y="0"/>
+          <a:ext cx="0" cy="0"/>
+          <a:chOff x="0" y="0"/>
+          <a:chExt cx="0" cy="0"/>
+        </a:xfrm>
+      </p:grpSpPr>
+      <p:sp>
+        <p:nvSpPr>
+          <p:cNvPr id="4" name="Titel 3">
+            <a:extLst>
+              <a:ext uri="{FF2B5EF4-FFF2-40B4-BE49-F238E27FC236}">
+                <a16:creationId xmlns:a16="http://schemas.microsoft.com/office/drawing/2014/main" id="{B7A11F0B-D7B5-422A-8580-1F8E0B45196D}"/>
+              </a:ext>
+            </a:extLst>
+          </p:cNvPr>
+          <p:cNvSpPr>
+            <a:spLocks noGrp="1"/>
+          </p:cNvSpPr>
+          <p:nvPr>
+            <p:ph type="title"/>
+          </p:nvPr>
+        </p:nvSpPr>
+        <p:spPr/>
+        <p:txBody>
+          <a:bodyPr/>
+          <a:lstStyle/>
+          <a:p>
+            <a:r>
+              <a:rPr lang="de-DE"/>
+              <a:t>Origin of the used imagery</a:t>
+            </a:r>
+          </a:p>
+        </p:txBody>
+      </p:sp>
+      <p:pic>
+        <p:nvPicPr>
+          <p:cNvPr id="3" name="Inhaltsplatzhalter 2">
+            <a:extLst>
+              <a:ext uri="{FF2B5EF4-FFF2-40B4-BE49-F238E27FC236}">
+                <a16:creationId xmlns:a16="http://schemas.microsoft.com/office/drawing/2014/main" id="{27E3023E-131E-45D7-90B5-CC04975FC34F}"/>
+              </a:ext>
+            </a:extLst>
+          </p:cNvPr>
+          <p:cNvPicPr>
+            <a:picLocks noGrp="1" noChangeAspect="1"/>
+          </p:cNvPicPr>
+          <p:nvPr>
+            <p:ph idx="1"/>
+          </p:nvPr>
+        </p:nvPicPr>
+        <p:blipFill>
+          <a:blip r:embed="rId2">
+            <a:extLst>
+              <a:ext uri="{28A0092B-C50C-407E-A947-70E740481C1C}">
+                <a14:useLocalDpi xmlns:a14="http://schemas.microsoft.com/office/drawing/2010/main" val="0"/>
+              </a:ext>
+            </a:extLst>
+          </a:blip>
+          <a:stretch>
+            <a:fillRect/>
+          </a:stretch>
+        </p:blipFill>
+        <p:spPr>
+          <a:xfrm>
+            <a:off x="4843585" y="1825625"/>
+            <a:ext cx="2504829" cy="4351338"/>
+          </a:xfrm>
+        </p:spPr>
+      </p:pic>
+      <p:sp>
+        <p:nvSpPr>
+          <p:cNvPr id="5" name="Rechteck 4">
+            <a:extLst>
+              <a:ext uri="{FF2B5EF4-FFF2-40B4-BE49-F238E27FC236}">
+                <a16:creationId xmlns:a16="http://schemas.microsoft.com/office/drawing/2014/main" id="{1C2F86E0-26D3-4C06-B9ED-744E9D0777C3}"/>
+              </a:ext>
+            </a:extLst>
+          </p:cNvPr>
+          <p:cNvSpPr/>
+          <p:nvPr/>
+        </p:nvSpPr>
+        <p:spPr>
+          <a:xfrm>
+            <a:off x="6177342" y="1517197"/>
+            <a:ext cx="1614256" cy="903618"/>
+          </a:xfrm>
+          <a:prstGeom prst="rect">
+            <a:avLst/>
+          </a:prstGeom>
+          <a:solidFill>
+            <a:schemeClr val="bg1"/>
+          </a:solidFill>
+        </p:spPr>
+        <p:style>
+          <a:lnRef idx="2">
+            <a:schemeClr val="accent1">
+              <a:shade val="50000"/>
+            </a:schemeClr>
+          </a:lnRef>
+          <a:fillRef idx="1">
+            <a:schemeClr val="accent1"/>
+          </a:fillRef>
+          <a:effectRef idx="0">
+            <a:schemeClr val="accent1"/>
+          </a:effectRef>
+          <a:fontRef idx="minor">
+            <a:schemeClr val="lt1"/>
+          </a:fontRef>
+        </p:style>
+        <p:txBody>
+          <a:bodyPr rtlCol="0" anchor="ctr"/>
+          <a:lstStyle/>
+          <a:p>
+            <a:pPr algn="ctr"/>
+            <a:r>
+              <a:rPr lang="de-DE" sz="3600">
+                <a:solidFill>
+                  <a:schemeClr val="tx1"/>
+                </a:solidFill>
+              </a:rPr>
+              <a:t>fork</a:t>
+            </a:r>
+          </a:p>
+        </p:txBody>
+      </p:sp>
+      <p:sp>
+        <p:nvSpPr>
+          <p:cNvPr id="6" name="Rechteck 5">
+            <a:extLst>
+              <a:ext uri="{FF2B5EF4-FFF2-40B4-BE49-F238E27FC236}">
+                <a16:creationId xmlns:a16="http://schemas.microsoft.com/office/drawing/2014/main" id="{085273E2-E03A-47C1-A138-728698DC3998}"/>
+              </a:ext>
+            </a:extLst>
+          </p:cNvPr>
+          <p:cNvSpPr/>
+          <p:nvPr/>
+        </p:nvSpPr>
+        <p:spPr>
+          <a:xfrm>
+            <a:off x="3292137" y="2893489"/>
+            <a:ext cx="1614256" cy="903618"/>
+          </a:xfrm>
+          <a:prstGeom prst="rect">
+            <a:avLst/>
+          </a:prstGeom>
+          <a:solidFill>
+            <a:schemeClr val="bg1"/>
+          </a:solidFill>
+        </p:spPr>
+        <p:style>
+          <a:lnRef idx="2">
+            <a:schemeClr val="accent1">
+              <a:shade val="50000"/>
+            </a:schemeClr>
+          </a:lnRef>
+          <a:fillRef idx="1">
+            <a:schemeClr val="accent1"/>
+          </a:fillRef>
+          <a:effectRef idx="0">
+            <a:schemeClr val="accent1"/>
+          </a:effectRef>
+          <a:fontRef idx="minor">
+            <a:schemeClr val="lt1"/>
+          </a:fontRef>
+        </p:style>
+        <p:txBody>
+          <a:bodyPr rtlCol="0" anchor="ctr"/>
+          <a:lstStyle/>
+          <a:p>
+            <a:pPr algn="ctr"/>
+            <a:r>
+              <a:rPr lang="de-DE" sz="3600">
+                <a:solidFill>
+                  <a:schemeClr val="tx1"/>
+                </a:solidFill>
+              </a:rPr>
+              <a:t>branch</a:t>
+            </a:r>
+          </a:p>
+        </p:txBody>
+      </p:sp>
+      <p:sp>
+        <p:nvSpPr>
+          <p:cNvPr id="7" name="Rechteck 6">
+            <a:extLst>
+              <a:ext uri="{FF2B5EF4-FFF2-40B4-BE49-F238E27FC236}">
+                <a16:creationId xmlns:a16="http://schemas.microsoft.com/office/drawing/2014/main" id="{1E6EC1A1-5E70-4123-8BAE-76633CA60034}"/>
+              </a:ext>
+            </a:extLst>
+          </p:cNvPr>
+          <p:cNvSpPr/>
+          <p:nvPr/>
+        </p:nvSpPr>
+        <p:spPr>
+          <a:xfrm>
+            <a:off x="6851343" y="5273345"/>
+            <a:ext cx="1614256" cy="903618"/>
+          </a:xfrm>
+          <a:prstGeom prst="rect">
+            <a:avLst/>
+          </a:prstGeom>
+          <a:solidFill>
+            <a:schemeClr val="bg1"/>
+          </a:solidFill>
+        </p:spPr>
+        <p:style>
+          <a:lnRef idx="2">
+            <a:schemeClr val="accent1">
+              <a:shade val="50000"/>
+            </a:schemeClr>
+          </a:lnRef>
+          <a:fillRef idx="1">
+            <a:schemeClr val="accent1"/>
+          </a:fillRef>
+          <a:effectRef idx="0">
+            <a:schemeClr val="accent1"/>
+          </a:effectRef>
+          <a:fontRef idx="minor">
+            <a:schemeClr val="lt1"/>
+          </a:fontRef>
+        </p:style>
+        <p:txBody>
+          <a:bodyPr rtlCol="0" anchor="ctr"/>
+          <a:lstStyle/>
+          <a:p>
+            <a:pPr algn="ctr"/>
+            <a:r>
+              <a:rPr lang="de-DE" sz="3600">
+                <a:solidFill>
+                  <a:schemeClr val="tx1"/>
+                </a:solidFill>
+              </a:rPr>
+              <a:t>trunk</a:t>
+            </a:r>
+          </a:p>
+        </p:txBody>
+      </p:sp>
+      <p:sp>
+        <p:nvSpPr>
+          <p:cNvPr id="8" name="Rechteck 7">
+            <a:extLst>
+              <a:ext uri="{FF2B5EF4-FFF2-40B4-BE49-F238E27FC236}">
+                <a16:creationId xmlns:a16="http://schemas.microsoft.com/office/drawing/2014/main" id="{890C8AD4-6E4A-4F7B-9F11-DC061806F879}"/>
+              </a:ext>
+            </a:extLst>
+          </p:cNvPr>
+          <p:cNvSpPr/>
+          <p:nvPr/>
+        </p:nvSpPr>
+        <p:spPr>
+          <a:xfrm>
+            <a:off x="3292137" y="5273345"/>
+            <a:ext cx="1614256" cy="903618"/>
+          </a:xfrm>
+          <a:prstGeom prst="rect">
+            <a:avLst/>
+          </a:prstGeom>
+          <a:solidFill>
+            <a:schemeClr val="bg1"/>
+          </a:solidFill>
+        </p:spPr>
+        <p:style>
+          <a:lnRef idx="2">
+            <a:schemeClr val="accent1">
+              <a:shade val="50000"/>
+            </a:schemeClr>
+          </a:lnRef>
+          <a:fillRef idx="1">
+            <a:schemeClr val="accent1"/>
+          </a:fillRef>
+          <a:effectRef idx="0">
+            <a:schemeClr val="accent1"/>
+          </a:effectRef>
+          <a:fontRef idx="minor">
+            <a:schemeClr val="lt1"/>
+          </a:fontRef>
+        </p:style>
+        <p:txBody>
+          <a:bodyPr rtlCol="0" anchor="ctr"/>
+          <a:lstStyle/>
+          <a:p>
+            <a:pPr algn="ctr"/>
+            <a:r>
+              <a:rPr lang="de-DE" sz="3600">
+                <a:solidFill>
+                  <a:schemeClr val="tx1"/>
+                </a:solidFill>
+              </a:rPr>
+              <a:t>tree</a:t>
+            </a:r>
+          </a:p>
+        </p:txBody>
+      </p:sp>
+    </p:spTree>
+    <p:extLst>
+      <p:ext uri="{BB962C8B-B14F-4D97-AF65-F5344CB8AC3E}">
+        <p14:creationId xmlns:p14="http://schemas.microsoft.com/office/powerpoint/2010/main" val="962787623"/>
+      </p:ext>
+    </p:extLst>
+  </p:cSld>
+  <p:clrMapOvr>
+    <a:masterClrMapping/>
+  </p:clrMapOvr>
+</p:sld>
+</file>
+
+<file path=ppt/slides/slide17.xml><?xml version="1.0" encoding="utf-8"?>
 <p:sld xmlns:a="http://schemas.openxmlformats.org/drawingml/2006/main" xmlns:r="http://schemas.openxmlformats.org/officeDocument/2006/relationships" xmlns:p="http://schemas.openxmlformats.org/presentationml/2006/main">
   <p:cSld>
     <p:spTree>
@@ -18787,7 +19399,7 @@
 </p:sld>
 </file>
 
-<file path=ppt/slides/slide15.xml><?xml version="1.0" encoding="utf-8"?>
+<file path=ppt/slides/slide18.xml><?xml version="1.0" encoding="utf-8"?>
 <p:sld xmlns:a="http://schemas.openxmlformats.org/drawingml/2006/main" xmlns:r="http://schemas.openxmlformats.org/officeDocument/2006/relationships" xmlns:p="http://schemas.openxmlformats.org/presentationml/2006/main">
   <p:cSld>
     <p:spTree>
@@ -19088,7 +19700,7 @@
 </p:sld>
 </file>
 
-<file path=ppt/slides/slide16.xml><?xml version="1.0" encoding="utf-8"?>
+<file path=ppt/slides/slide19.xml><?xml version="1.0" encoding="utf-8"?>
 <p:sld xmlns:a="http://schemas.openxmlformats.org/drawingml/2006/main" xmlns:r="http://schemas.openxmlformats.org/officeDocument/2006/relationships" xmlns:p="http://schemas.openxmlformats.org/presentationml/2006/main">
   <p:cSld>
     <p:spTree>
@@ -19331,7 +19943,151 @@
 </p:sld>
 </file>
 
-<file path=ppt/slides/slide17.xml><?xml version="1.0" encoding="utf-8"?>
+<file path=ppt/slides/slide2.xml><?xml version="1.0" encoding="utf-8"?>
+<p:sld xmlns:a="http://schemas.openxmlformats.org/drawingml/2006/main" xmlns:r="http://schemas.openxmlformats.org/officeDocument/2006/relationships" xmlns:p="http://schemas.openxmlformats.org/presentationml/2006/main">
+  <p:cSld>
+    <p:spTree>
+      <p:nvGrpSpPr>
+        <p:cNvPr id="1" name=""/>
+        <p:cNvGrpSpPr/>
+        <p:nvPr/>
+      </p:nvGrpSpPr>
+      <p:grpSpPr>
+        <a:xfrm>
+          <a:off x="0" y="0"/>
+          <a:ext cx="0" cy="0"/>
+          <a:chOff x="0" y="0"/>
+          <a:chExt cx="0" cy="0"/>
+        </a:xfrm>
+      </p:grpSpPr>
+      <p:sp>
+        <p:nvSpPr>
+          <p:cNvPr id="4" name="Titel 3">
+            <a:extLst>
+              <a:ext uri="{FF2B5EF4-FFF2-40B4-BE49-F238E27FC236}">
+                <a16:creationId xmlns:a16="http://schemas.microsoft.com/office/drawing/2014/main" id="{5B48809F-0C31-4B2C-88EF-39C4AF82E6CD}"/>
+              </a:ext>
+            </a:extLst>
+          </p:cNvPr>
+          <p:cNvSpPr>
+            <a:spLocks noGrp="1"/>
+          </p:cNvSpPr>
+          <p:nvPr>
+            <p:ph type="title"/>
+          </p:nvPr>
+        </p:nvSpPr>
+        <p:spPr/>
+        <p:txBody>
+          <a:bodyPr/>
+          <a:lstStyle/>
+          <a:p>
+            <a:r>
+              <a:rPr lang="de-DE"/>
+              <a:t>Table of Contents</a:t>
+            </a:r>
+          </a:p>
+        </p:txBody>
+      </p:sp>
+      <p:sp>
+        <p:nvSpPr>
+          <p:cNvPr id="5" name="Inhaltsplatzhalter 4">
+            <a:extLst>
+              <a:ext uri="{FF2B5EF4-FFF2-40B4-BE49-F238E27FC236}">
+                <a16:creationId xmlns:a16="http://schemas.microsoft.com/office/drawing/2014/main" id="{8C5C0079-8A63-4235-BB11-6E5D2B206423}"/>
+              </a:ext>
+            </a:extLst>
+          </p:cNvPr>
+          <p:cNvSpPr>
+            <a:spLocks noGrp="1"/>
+          </p:cNvSpPr>
+          <p:nvPr>
+            <p:ph idx="1"/>
+          </p:nvPr>
+        </p:nvSpPr>
+        <p:spPr/>
+        <p:txBody>
+          <a:bodyPr/>
+          <a:lstStyle/>
+          <a:p>
+            <a:pPr marL="571500" indent="-571500">
+              <a:buFont typeface="+mj-lt"/>
+              <a:buAutoNum type="romanUcPeriod"/>
+            </a:pPr>
+            <a:r>
+              <a:rPr lang="de-DE"/>
+              <a:t>Introduction</a:t>
+            </a:r>
+          </a:p>
+          <a:p>
+            <a:pPr marL="571500" indent="-571500">
+              <a:buFont typeface="+mj-lt"/>
+              <a:buAutoNum type="romanUcPeriod"/>
+            </a:pPr>
+            <a:r>
+              <a:rPr lang="de-DE"/>
+              <a:t>Professional use</a:t>
+            </a:r>
+          </a:p>
+          <a:p>
+            <a:pPr marL="571500" indent="-571500">
+              <a:buFont typeface="+mj-lt"/>
+              <a:buAutoNum type="romanUcPeriod"/>
+            </a:pPr>
+            <a:r>
+              <a:rPr lang="de-DE"/>
+              <a:t>Interactive Example</a:t>
+            </a:r>
+          </a:p>
+          <a:p>
+            <a:pPr marL="571500" indent="-571500">
+              <a:buFont typeface="+mj-lt"/>
+              <a:buAutoNum type="romanUcPeriod"/>
+            </a:pPr>
+            <a:r>
+              <a:rPr lang="de-DE"/>
+              <a:t>Mechanics and Jargon</a:t>
+            </a:r>
+          </a:p>
+          <a:p>
+            <a:pPr marL="571500" indent="-571500">
+              <a:buFont typeface="+mj-lt"/>
+              <a:buAutoNum type="romanUcPeriod"/>
+            </a:pPr>
+            <a:r>
+              <a:rPr lang="de-DE"/>
+              <a:t>Sources</a:t>
+            </a:r>
+          </a:p>
+          <a:p>
+            <a:pPr marL="571500" indent="-571500">
+              <a:buFont typeface="+mj-lt"/>
+              <a:buAutoNum type="romanUcPeriod"/>
+            </a:pPr>
+            <a:endParaRPr lang="de-DE"/>
+          </a:p>
+          <a:p>
+            <a:pPr marL="571500" indent="-571500">
+              <a:buFont typeface="+mj-lt"/>
+              <a:buAutoNum type="romanUcPeriod"/>
+            </a:pPr>
+            <a:endParaRPr lang="de-DE"/>
+          </a:p>
+        </p:txBody>
+      </p:sp>
+    </p:spTree>
+    <p:extLst>
+      <p:ext uri="{BB962C8B-B14F-4D97-AF65-F5344CB8AC3E}">
+        <p14:creationId xmlns:p14="http://schemas.microsoft.com/office/powerpoint/2010/main" val="731089537"/>
+      </p:ext>
+    </p:extLst>
+  </p:cSld>
+  <p:clrMapOvr>
+    <a:masterClrMapping/>
+  </p:clrMapOvr>
+</p:sld>
+</file>
+
+<file path=ppt/slides/slide20.xml><?xml version="1.0" encoding="utf-8"?>
 <p:sld xmlns:a="http://schemas.openxmlformats.org/drawingml/2006/main" xmlns:r="http://schemas.openxmlformats.org/officeDocument/2006/relationships" xmlns:p="http://schemas.openxmlformats.org/presentationml/2006/main">
   <p:cSld>
     <p:spTree>
@@ -19423,7 +20179,7 @@
             <p:ph sz="half" idx="2"/>
             <p:extLst>
               <p:ext uri="{D42A27DB-BD31-4B8C-83A1-F6EECF244321}">
-                <p14:modId xmlns:p14="http://schemas.microsoft.com/office/powerpoint/2010/main" val="505362942"/>
+                <p14:modId xmlns:p14="http://schemas.microsoft.com/office/powerpoint/2010/main" val="51087091"/>
               </p:ext>
             </p:extLst>
           </p:nvPr>
@@ -19452,7 +20208,7 @@
         </p:nvSpPr>
         <p:spPr>
           <a:xfrm>
-            <a:off x="6486618" y="4828189"/>
+            <a:off x="6554126" y="2461334"/>
             <a:ext cx="1961965" cy="967666"/>
           </a:xfrm>
           <a:prstGeom prst="rect">
@@ -19516,7 +20272,7 @@
         </p:nvSpPr>
         <p:spPr>
           <a:xfrm>
-            <a:off x="8920209" y="4828189"/>
+            <a:off x="8763000" y="2461334"/>
             <a:ext cx="1961965" cy="967666"/>
           </a:xfrm>
           <a:prstGeom prst="rect">
@@ -19557,98 +20313,6 @@
       </p:sp>
       <p:sp>
         <p:nvSpPr>
-          <p:cNvPr id="5" name="Pfeil: nach oben 4">
-            <a:extLst>
-              <a:ext uri="{FF2B5EF4-FFF2-40B4-BE49-F238E27FC236}">
-                <a16:creationId xmlns:a16="http://schemas.microsoft.com/office/drawing/2014/main" id="{30FA2CF9-6086-4152-A69B-FF1A4735B76B}"/>
-              </a:ext>
-            </a:extLst>
-          </p:cNvPr>
-          <p:cNvSpPr/>
-          <p:nvPr/>
-        </p:nvSpPr>
-        <p:spPr>
-          <a:xfrm>
-            <a:off x="8196495" y="3625898"/>
-            <a:ext cx="319596" cy="683579"/>
-          </a:xfrm>
-          <a:prstGeom prst="upArrow">
-            <a:avLst/>
-          </a:prstGeom>
-        </p:spPr>
-        <p:style>
-          <a:lnRef idx="2">
-            <a:schemeClr val="dk1">
-              <a:shade val="50000"/>
-            </a:schemeClr>
-          </a:lnRef>
-          <a:fillRef idx="1">
-            <a:schemeClr val="dk1"/>
-          </a:fillRef>
-          <a:effectRef idx="0">
-            <a:schemeClr val="dk1"/>
-          </a:effectRef>
-          <a:fontRef idx="minor">
-            <a:schemeClr val="lt1"/>
-          </a:fontRef>
-        </p:style>
-        <p:txBody>
-          <a:bodyPr rtlCol="0" anchor="ctr"/>
-          <a:lstStyle/>
-          <a:p>
-            <a:pPr algn="ctr"/>
-            <a:endParaRPr lang="de-DE"/>
-          </a:p>
-        </p:txBody>
-      </p:sp>
-      <p:sp>
-        <p:nvSpPr>
-          <p:cNvPr id="11" name="Pfeil: nach oben 10">
-            <a:extLst>
-              <a:ext uri="{FF2B5EF4-FFF2-40B4-BE49-F238E27FC236}">
-                <a16:creationId xmlns:a16="http://schemas.microsoft.com/office/drawing/2014/main" id="{4148348B-BA43-494D-B65D-24F6B5821584}"/>
-              </a:ext>
-            </a:extLst>
-          </p:cNvPr>
-          <p:cNvSpPr/>
-          <p:nvPr/>
-        </p:nvSpPr>
-        <p:spPr>
-          <a:xfrm>
-            <a:off x="8920209" y="3625898"/>
-            <a:ext cx="319596" cy="683579"/>
-          </a:xfrm>
-          <a:prstGeom prst="upArrow">
-            <a:avLst/>
-          </a:prstGeom>
-        </p:spPr>
-        <p:style>
-          <a:lnRef idx="2">
-            <a:schemeClr val="dk1">
-              <a:shade val="50000"/>
-            </a:schemeClr>
-          </a:lnRef>
-          <a:fillRef idx="1">
-            <a:schemeClr val="dk1"/>
-          </a:fillRef>
-          <a:effectRef idx="0">
-            <a:schemeClr val="dk1"/>
-          </a:effectRef>
-          <a:fontRef idx="minor">
-            <a:schemeClr val="lt1"/>
-          </a:fontRef>
-        </p:style>
-        <p:txBody>
-          <a:bodyPr rtlCol="0" anchor="ctr"/>
-          <a:lstStyle/>
-          <a:p>
-            <a:pPr algn="ctr"/>
-            <a:endParaRPr lang="de-DE"/>
-          </a:p>
-        </p:txBody>
-      </p:sp>
-      <p:sp>
-        <p:nvSpPr>
           <p:cNvPr id="12" name="Rechteck 11">
             <a:extLst>
               <a:ext uri="{FF2B5EF4-FFF2-40B4-BE49-F238E27FC236}">
@@ -19661,7 +20325,7 @@
         </p:nvSpPr>
         <p:spPr>
           <a:xfrm>
-            <a:off x="6486618" y="3543463"/>
+            <a:off x="5697894" y="3612900"/>
             <a:ext cx="1614256" cy="903618"/>
           </a:xfrm>
           <a:prstGeom prst="rect">
@@ -19703,6 +20367,84 @@
           </a:p>
         </p:txBody>
       </p:sp>
+      <p:cxnSp>
+        <p:nvCxnSpPr>
+          <p:cNvPr id="9" name="Verbinder: gekrümmt 8">
+            <a:extLst>
+              <a:ext uri="{FF2B5EF4-FFF2-40B4-BE49-F238E27FC236}">
+                <a16:creationId xmlns:a16="http://schemas.microsoft.com/office/drawing/2014/main" id="{33C02085-38A9-4A85-9CA9-916AE4DB3207}"/>
+              </a:ext>
+            </a:extLst>
+          </p:cNvPr>
+          <p:cNvCxnSpPr/>
+          <p:nvPr/>
+        </p:nvCxnSpPr>
+        <p:spPr>
+          <a:xfrm rot="16200000" flipH="1">
+            <a:off x="7142178" y="3821929"/>
+            <a:ext cx="1231777" cy="445917"/>
+          </a:xfrm>
+          <a:prstGeom prst="curvedConnector3">
+            <a:avLst/>
+          </a:prstGeom>
+          <a:ln w="50800">
+            <a:tailEnd type="triangle"/>
+          </a:ln>
+        </p:spPr>
+        <p:style>
+          <a:lnRef idx="1">
+            <a:schemeClr val="dk1"/>
+          </a:lnRef>
+          <a:fillRef idx="0">
+            <a:schemeClr val="dk1"/>
+          </a:fillRef>
+          <a:effectRef idx="0">
+            <a:schemeClr val="dk1"/>
+          </a:effectRef>
+          <a:fontRef idx="minor">
+            <a:schemeClr val="tx1"/>
+          </a:fontRef>
+        </p:style>
+      </p:cxnSp>
+      <p:cxnSp>
+        <p:nvCxnSpPr>
+          <p:cNvPr id="13" name="Verbinder: gekrümmt 12">
+            <a:extLst>
+              <a:ext uri="{FF2B5EF4-FFF2-40B4-BE49-F238E27FC236}">
+                <a16:creationId xmlns:a16="http://schemas.microsoft.com/office/drawing/2014/main" id="{B4E7DBDD-13A8-4279-BC73-F892CD63FFC4}"/>
+              </a:ext>
+            </a:extLst>
+          </p:cNvPr>
+          <p:cNvCxnSpPr/>
+          <p:nvPr/>
+        </p:nvCxnSpPr>
+        <p:spPr>
+          <a:xfrm rot="5400000">
+            <a:off x="8741915" y="3649091"/>
+            <a:ext cx="1231778" cy="791593"/>
+          </a:xfrm>
+          <a:prstGeom prst="curvedConnector3">
+            <a:avLst/>
+          </a:prstGeom>
+          <a:ln w="50800">
+            <a:tailEnd type="triangle"/>
+          </a:ln>
+        </p:spPr>
+        <p:style>
+          <a:lnRef idx="1">
+            <a:schemeClr val="dk1"/>
+          </a:lnRef>
+          <a:fillRef idx="0">
+            <a:schemeClr val="dk1"/>
+          </a:fillRef>
+          <a:effectRef idx="0">
+            <a:schemeClr val="dk1"/>
+          </a:effectRef>
+          <a:fontRef idx="minor">
+            <a:schemeClr val="tx1"/>
+          </a:fontRef>
+        </p:style>
+      </p:cxnSp>
     </p:spTree>
     <p:extLst>
       <p:ext uri="{BB962C8B-B14F-4D97-AF65-F5344CB8AC3E}">
@@ -19716,7 +20458,7 @@
 </p:sld>
 </file>
 
-<file path=ppt/slides/slide18.xml><?xml version="1.0" encoding="utf-8"?>
+<file path=ppt/slides/slide21.xml><?xml version="1.0" encoding="utf-8"?>
 <p:sld xmlns:a="http://schemas.openxmlformats.org/drawingml/2006/main" xmlns:r="http://schemas.openxmlformats.org/officeDocument/2006/relationships" xmlns:p="http://schemas.openxmlformats.org/presentationml/2006/main">
   <p:cSld>
     <p:spTree>
@@ -20102,7 +20844,7 @@
 </p:sld>
 </file>
 
-<file path=ppt/slides/slide19.xml><?xml version="1.0" encoding="utf-8"?>
+<file path=ppt/slides/slide22.xml><?xml version="1.0" encoding="utf-8"?>
 <p:sld xmlns:a="http://schemas.openxmlformats.org/drawingml/2006/main" xmlns:r="http://schemas.openxmlformats.org/officeDocument/2006/relationships" xmlns:p="http://schemas.openxmlformats.org/presentationml/2006/main">
   <p:cSld>
     <p:spTree>
@@ -20697,151 +21439,7 @@
 </p:sld>
 </file>
 
-<file path=ppt/slides/slide2.xml><?xml version="1.0" encoding="utf-8"?>
-<p:sld xmlns:a="http://schemas.openxmlformats.org/drawingml/2006/main" xmlns:r="http://schemas.openxmlformats.org/officeDocument/2006/relationships" xmlns:p="http://schemas.openxmlformats.org/presentationml/2006/main">
-  <p:cSld>
-    <p:spTree>
-      <p:nvGrpSpPr>
-        <p:cNvPr id="1" name=""/>
-        <p:cNvGrpSpPr/>
-        <p:nvPr/>
-      </p:nvGrpSpPr>
-      <p:grpSpPr>
-        <a:xfrm>
-          <a:off x="0" y="0"/>
-          <a:ext cx="0" cy="0"/>
-          <a:chOff x="0" y="0"/>
-          <a:chExt cx="0" cy="0"/>
-        </a:xfrm>
-      </p:grpSpPr>
-      <p:sp>
-        <p:nvSpPr>
-          <p:cNvPr id="4" name="Titel 3">
-            <a:extLst>
-              <a:ext uri="{FF2B5EF4-FFF2-40B4-BE49-F238E27FC236}">
-                <a16:creationId xmlns:a16="http://schemas.microsoft.com/office/drawing/2014/main" id="{5B48809F-0C31-4B2C-88EF-39C4AF82E6CD}"/>
-              </a:ext>
-            </a:extLst>
-          </p:cNvPr>
-          <p:cNvSpPr>
-            <a:spLocks noGrp="1"/>
-          </p:cNvSpPr>
-          <p:nvPr>
-            <p:ph type="title"/>
-          </p:nvPr>
-        </p:nvSpPr>
-        <p:spPr/>
-        <p:txBody>
-          <a:bodyPr/>
-          <a:lstStyle/>
-          <a:p>
-            <a:r>
-              <a:rPr lang="de-DE"/>
-              <a:t>Table of Contents</a:t>
-            </a:r>
-          </a:p>
-        </p:txBody>
-      </p:sp>
-      <p:sp>
-        <p:nvSpPr>
-          <p:cNvPr id="5" name="Inhaltsplatzhalter 4">
-            <a:extLst>
-              <a:ext uri="{FF2B5EF4-FFF2-40B4-BE49-F238E27FC236}">
-                <a16:creationId xmlns:a16="http://schemas.microsoft.com/office/drawing/2014/main" id="{8C5C0079-8A63-4235-BB11-6E5D2B206423}"/>
-              </a:ext>
-            </a:extLst>
-          </p:cNvPr>
-          <p:cNvSpPr>
-            <a:spLocks noGrp="1"/>
-          </p:cNvSpPr>
-          <p:nvPr>
-            <p:ph idx="1"/>
-          </p:nvPr>
-        </p:nvSpPr>
-        <p:spPr/>
-        <p:txBody>
-          <a:bodyPr/>
-          <a:lstStyle/>
-          <a:p>
-            <a:pPr marL="571500" indent="-571500">
-              <a:buFont typeface="+mj-lt"/>
-              <a:buAutoNum type="romanUcPeriod"/>
-            </a:pPr>
-            <a:r>
-              <a:rPr lang="de-DE"/>
-              <a:t>Introduction</a:t>
-            </a:r>
-          </a:p>
-          <a:p>
-            <a:pPr marL="571500" indent="-571500">
-              <a:buFont typeface="+mj-lt"/>
-              <a:buAutoNum type="romanUcPeriod"/>
-            </a:pPr>
-            <a:r>
-              <a:rPr lang="de-DE"/>
-              <a:t>Professional use</a:t>
-            </a:r>
-          </a:p>
-          <a:p>
-            <a:pPr marL="571500" indent="-571500">
-              <a:buFont typeface="+mj-lt"/>
-              <a:buAutoNum type="romanUcPeriod"/>
-            </a:pPr>
-            <a:r>
-              <a:rPr lang="de-DE"/>
-              <a:t>Interactive Example</a:t>
-            </a:r>
-          </a:p>
-          <a:p>
-            <a:pPr marL="571500" indent="-571500">
-              <a:buFont typeface="+mj-lt"/>
-              <a:buAutoNum type="romanUcPeriod"/>
-            </a:pPr>
-            <a:r>
-              <a:rPr lang="de-DE"/>
-              <a:t>Mechanics and Jargon</a:t>
-            </a:r>
-          </a:p>
-          <a:p>
-            <a:pPr marL="571500" indent="-571500">
-              <a:buFont typeface="+mj-lt"/>
-              <a:buAutoNum type="romanUcPeriod"/>
-            </a:pPr>
-            <a:r>
-              <a:rPr lang="de-DE"/>
-              <a:t>Sources</a:t>
-            </a:r>
-          </a:p>
-          <a:p>
-            <a:pPr marL="571500" indent="-571500">
-              <a:buFont typeface="+mj-lt"/>
-              <a:buAutoNum type="romanUcPeriod"/>
-            </a:pPr>
-            <a:endParaRPr lang="de-DE"/>
-          </a:p>
-          <a:p>
-            <a:pPr marL="571500" indent="-571500">
-              <a:buFont typeface="+mj-lt"/>
-              <a:buAutoNum type="romanUcPeriod"/>
-            </a:pPr>
-            <a:endParaRPr lang="de-DE"/>
-          </a:p>
-        </p:txBody>
-      </p:sp>
-    </p:spTree>
-    <p:extLst>
-      <p:ext uri="{BB962C8B-B14F-4D97-AF65-F5344CB8AC3E}">
-        <p14:creationId xmlns:p14="http://schemas.microsoft.com/office/powerpoint/2010/main" val="731089537"/>
-      </p:ext>
-    </p:extLst>
-  </p:cSld>
-  <p:clrMapOvr>
-    <a:masterClrMapping/>
-  </p:clrMapOvr>
-</p:sld>
-</file>
-
-<file path=ppt/slides/slide20.xml><?xml version="1.0" encoding="utf-8"?>
+<file path=ppt/slides/slide23.xml><?xml version="1.0" encoding="utf-8"?>
 <p:sld xmlns:a="http://schemas.openxmlformats.org/drawingml/2006/main" xmlns:r="http://schemas.openxmlformats.org/officeDocument/2006/relationships" xmlns:p="http://schemas.openxmlformats.org/presentationml/2006/main">
   <p:cSld>
     <p:spTree>
@@ -21090,7 +21688,7 @@
 </p:sld>
 </file>
 
-<file path=ppt/slides/slide21.xml><?xml version="1.0" encoding="utf-8"?>
+<file path=ppt/slides/slide24.xml><?xml version="1.0" encoding="utf-8"?>
 <p:sld xmlns:a="http://schemas.openxmlformats.org/drawingml/2006/main" xmlns:r="http://schemas.openxmlformats.org/officeDocument/2006/relationships" xmlns:p="http://schemas.openxmlformats.org/presentationml/2006/main">
   <p:cSld>
     <p:spTree>
@@ -21285,7 +21883,7 @@
 </p:sld>
 </file>
 
-<file path=ppt/slides/slide22.xml><?xml version="1.0" encoding="utf-8"?>
+<file path=ppt/slides/slide25.xml><?xml version="1.0" encoding="utf-8"?>
 <p:sld xmlns:a="http://schemas.openxmlformats.org/drawingml/2006/main" xmlns:r="http://schemas.openxmlformats.org/officeDocument/2006/relationships" xmlns:p="http://schemas.openxmlformats.org/presentationml/2006/main">
   <p:cSld>
     <p:spTree>
@@ -21550,7 +22148,7 @@
 </p:sld>
 </file>
 
-<file path=ppt/slides/slide23.xml><?xml version="1.0" encoding="utf-8"?>
+<file path=ppt/slides/slide26.xml><?xml version="1.0" encoding="utf-8"?>
 <p:sld xmlns:a="http://schemas.openxmlformats.org/drawingml/2006/main" xmlns:r="http://schemas.openxmlformats.org/officeDocument/2006/relationships" xmlns:p="http://schemas.openxmlformats.org/presentationml/2006/main">
   <p:cSld>
     <p:spTree>
@@ -21932,7 +22530,7 @@
 </p:sld>
 </file>
 
-<file path=ppt/slides/slide24.xml><?xml version="1.0" encoding="utf-8"?>
+<file path=ppt/slides/slide27.xml><?xml version="1.0" encoding="utf-8"?>
 <p:sld xmlns:a="http://schemas.openxmlformats.org/drawingml/2006/main" xmlns:r="http://schemas.openxmlformats.org/officeDocument/2006/relationships" xmlns:p="http://schemas.openxmlformats.org/presentationml/2006/main">
   <p:cSld>
     <p:spTree>
@@ -22113,7 +22711,7 @@
 </p:sld>
 </file>
 
-<file path=ppt/slides/slide25.xml><?xml version="1.0" encoding="utf-8"?>
+<file path=ppt/slides/slide28.xml><?xml version="1.0" encoding="utf-8"?>
 <p:sld xmlns:a="http://schemas.openxmlformats.org/drawingml/2006/main" xmlns:r="http://schemas.openxmlformats.org/officeDocument/2006/relationships" xmlns:p="http://schemas.openxmlformats.org/presentationml/2006/main">
   <p:cSld>
     <p:spTree>
@@ -22351,7 +22949,7 @@
 </p:sld>
 </file>
 
-<file path=ppt/slides/slide26.xml><?xml version="1.0" encoding="utf-8"?>
+<file path=ppt/slides/slide29.xml><?xml version="1.0" encoding="utf-8"?>
 <p:sld xmlns:a="http://schemas.openxmlformats.org/drawingml/2006/main" xmlns:r="http://schemas.openxmlformats.org/officeDocument/2006/relationships" xmlns:p="http://schemas.openxmlformats.org/presentationml/2006/main">
   <p:cSld>
     <p:spTree>
@@ -22726,148 +23324,6 @@
 </p:sld>
 </file>
 
-<file path=ppt/slides/slide27.xml><?xml version="1.0" encoding="utf-8"?>
-<p:sld xmlns:a="http://schemas.openxmlformats.org/drawingml/2006/main" xmlns:r="http://schemas.openxmlformats.org/officeDocument/2006/relationships" xmlns:p="http://schemas.openxmlformats.org/presentationml/2006/main">
-  <p:cSld>
-    <p:spTree>
-      <p:nvGrpSpPr>
-        <p:cNvPr id="1" name=""/>
-        <p:cNvGrpSpPr/>
-        <p:nvPr/>
-      </p:nvGrpSpPr>
-      <p:grpSpPr>
-        <a:xfrm>
-          <a:off x="0" y="0"/>
-          <a:ext cx="0" cy="0"/>
-          <a:chOff x="0" y="0"/>
-          <a:chExt cx="0" cy="0"/>
-        </a:xfrm>
-      </p:grpSpPr>
-      <p:sp>
-        <p:nvSpPr>
-          <p:cNvPr id="2" name="Titel 1"/>
-          <p:cNvSpPr>
-            <a:spLocks noGrp="1"/>
-          </p:cNvSpPr>
-          <p:nvPr>
-            <p:ph type="title"/>
-          </p:nvPr>
-        </p:nvSpPr>
-        <p:spPr/>
-        <p:txBody>
-          <a:bodyPr/>
-          <a:lstStyle/>
-          <a:p>
-            <a:r>
-              <a:rPr lang="de-DE"/>
-              <a:t>Sources</a:t>
-            </a:r>
-          </a:p>
-        </p:txBody>
-      </p:sp>
-      <p:sp>
-        <p:nvSpPr>
-          <p:cNvPr id="3" name="Inhaltsplatzhalter 2"/>
-          <p:cNvSpPr>
-            <a:spLocks noGrp="1"/>
-          </p:cNvSpPr>
-          <p:nvPr>
-            <p:ph idx="1"/>
-          </p:nvPr>
-        </p:nvSpPr>
-        <p:spPr/>
-        <p:txBody>
-          <a:bodyPr/>
-          <a:lstStyle/>
-          <a:p>
-            <a:endParaRPr lang="de-DE"/>
-          </a:p>
-        </p:txBody>
-      </p:sp>
-    </p:spTree>
-    <p:extLst>
-      <p:ext uri="{BB962C8B-B14F-4D97-AF65-F5344CB8AC3E}">
-        <p14:creationId xmlns:p14="http://schemas.microsoft.com/office/powerpoint/2010/main" val="560282884"/>
-      </p:ext>
-    </p:extLst>
-  </p:cSld>
-  <p:clrMapOvr>
-    <a:masterClrMapping/>
-  </p:clrMapOvr>
-</p:sld>
-</file>
-
-<file path=ppt/slides/slide28.xml><?xml version="1.0" encoding="utf-8"?>
-<p:sld xmlns:a="http://schemas.openxmlformats.org/drawingml/2006/main" xmlns:r="http://schemas.openxmlformats.org/officeDocument/2006/relationships" xmlns:p="http://schemas.openxmlformats.org/presentationml/2006/main">
-  <p:cSld>
-    <p:spTree>
-      <p:nvGrpSpPr>
-        <p:cNvPr id="1" name=""/>
-        <p:cNvGrpSpPr/>
-        <p:nvPr/>
-      </p:nvGrpSpPr>
-      <p:grpSpPr>
-        <a:xfrm>
-          <a:off x="0" y="0"/>
-          <a:ext cx="0" cy="0"/>
-          <a:chOff x="0" y="0"/>
-          <a:chExt cx="0" cy="0"/>
-        </a:xfrm>
-      </p:grpSpPr>
-      <p:sp>
-        <p:nvSpPr>
-          <p:cNvPr id="2" name="Titel 1"/>
-          <p:cNvSpPr>
-            <a:spLocks noGrp="1"/>
-          </p:cNvSpPr>
-          <p:nvPr>
-            <p:ph type="title"/>
-          </p:nvPr>
-        </p:nvSpPr>
-        <p:spPr/>
-        <p:txBody>
-          <a:bodyPr/>
-          <a:lstStyle/>
-          <a:p>
-            <a:r>
-              <a:rPr lang="de-DE"/>
-              <a:t>THX &amp; BYE</a:t>
-            </a:r>
-          </a:p>
-        </p:txBody>
-      </p:sp>
-      <p:sp>
-        <p:nvSpPr>
-          <p:cNvPr id="3" name="Inhaltsplatzhalter 2"/>
-          <p:cNvSpPr>
-            <a:spLocks noGrp="1"/>
-          </p:cNvSpPr>
-          <p:nvPr>
-            <p:ph idx="1"/>
-          </p:nvPr>
-        </p:nvSpPr>
-        <p:spPr/>
-        <p:txBody>
-          <a:bodyPr/>
-          <a:lstStyle/>
-          <a:p>
-            <a:endParaRPr lang="de-DE"/>
-          </a:p>
-        </p:txBody>
-      </p:sp>
-    </p:spTree>
-    <p:extLst>
-      <p:ext uri="{BB962C8B-B14F-4D97-AF65-F5344CB8AC3E}">
-        <p14:creationId xmlns:p14="http://schemas.microsoft.com/office/powerpoint/2010/main" val="2305008801"/>
-      </p:ext>
-    </p:extLst>
-  </p:cSld>
-  <p:clrMapOvr>
-    <a:masterClrMapping/>
-  </p:clrMapOvr>
-</p:sld>
-</file>
-
 <file path=ppt/slides/slide3.xml><?xml version="1.0" encoding="utf-8"?>
 <p:sld xmlns:a="http://schemas.openxmlformats.org/drawingml/2006/main" xmlns:r="http://schemas.openxmlformats.org/officeDocument/2006/relationships" xmlns:p="http://schemas.openxmlformats.org/presentationml/2006/main">
   <p:cSld>
@@ -22945,6 +23401,195 @@
     <p:extLst>
       <p:ext uri="{BB962C8B-B14F-4D97-AF65-F5344CB8AC3E}">
         <p14:creationId xmlns:p14="http://schemas.microsoft.com/office/powerpoint/2010/main" val="2372903373"/>
+      </p:ext>
+    </p:extLst>
+  </p:cSld>
+  <p:clrMapOvr>
+    <a:masterClrMapping/>
+  </p:clrMapOvr>
+</p:sld>
+</file>
+
+<file path=ppt/slides/slide30.xml><?xml version="1.0" encoding="utf-8"?>
+<p:sld xmlns:a="http://schemas.openxmlformats.org/drawingml/2006/main" xmlns:r="http://schemas.openxmlformats.org/officeDocument/2006/relationships" xmlns:p="http://schemas.openxmlformats.org/presentationml/2006/main">
+  <p:cSld>
+    <p:spTree>
+      <p:nvGrpSpPr>
+        <p:cNvPr id="1" name=""/>
+        <p:cNvGrpSpPr/>
+        <p:nvPr/>
+      </p:nvGrpSpPr>
+      <p:grpSpPr>
+        <a:xfrm>
+          <a:off x="0" y="0"/>
+          <a:ext cx="0" cy="0"/>
+          <a:chOff x="0" y="0"/>
+          <a:chExt cx="0" cy="0"/>
+        </a:xfrm>
+      </p:grpSpPr>
+      <p:sp>
+        <p:nvSpPr>
+          <p:cNvPr id="2" name="Titel 1"/>
+          <p:cNvSpPr>
+            <a:spLocks noGrp="1"/>
+          </p:cNvSpPr>
+          <p:nvPr>
+            <p:ph type="title"/>
+          </p:nvPr>
+        </p:nvSpPr>
+        <p:spPr/>
+        <p:txBody>
+          <a:bodyPr/>
+          <a:lstStyle/>
+          <a:p>
+            <a:r>
+              <a:rPr lang="de-DE"/>
+              <a:t>Sources</a:t>
+            </a:r>
+          </a:p>
+        </p:txBody>
+      </p:sp>
+      <p:sp>
+        <p:nvSpPr>
+          <p:cNvPr id="3" name="Inhaltsplatzhalter 2"/>
+          <p:cNvSpPr>
+            <a:spLocks noGrp="1"/>
+          </p:cNvSpPr>
+          <p:nvPr>
+            <p:ph idx="1"/>
+          </p:nvPr>
+        </p:nvSpPr>
+        <p:spPr/>
+        <p:txBody>
+          <a:bodyPr>
+            <a:normAutofit lnSpcReduction="10000"/>
+          </a:bodyPr>
+          <a:lstStyle/>
+          <a:p>
+            <a:r>
+              <a:rPr lang="de-DE"/>
+              <a:t>Images: Own works only</a:t>
+            </a:r>
+          </a:p>
+          <a:p>
+            <a:r>
+              <a:rPr lang="de-DE"/>
+              <a:t>www.joelonsoftware.com/2000/08/09/the-joel-test-12-steps-to-better-code/</a:t>
+            </a:r>
+          </a:p>
+          <a:p>
+            <a:r>
+              <a:rPr lang="de-DE"/>
+              <a:t>en.wikipedia.org/wiki/Version_control</a:t>
+            </a:r>
+          </a:p>
+          <a:p>
+            <a:r>
+              <a:rPr lang="de-DE"/>
+              <a:t>en.wikipedia.org/wiki/Comparison_of_version_control_software</a:t>
+            </a:r>
+          </a:p>
+          <a:p>
+            <a:r>
+              <a:rPr lang="de-DE"/>
+              <a:t>guides.github.com/introduction/git-handbook/</a:t>
+            </a:r>
+          </a:p>
+          <a:p>
+            <a:r>
+              <a:rPr lang="de-DE"/>
+              <a:t>www.mercurial-scm.org/</a:t>
+            </a:r>
+          </a:p>
+          <a:p>
+            <a:r>
+              <a:rPr lang="de-DE"/>
+              <a:t>www.git-scm.org/</a:t>
+            </a:r>
+          </a:p>
+          <a:p>
+            <a:r>
+              <a:rPr lang="de-DE"/>
+              <a:t>subversion.apache.org/</a:t>
+            </a:r>
+          </a:p>
+        </p:txBody>
+      </p:sp>
+    </p:spTree>
+    <p:extLst>
+      <p:ext uri="{BB962C8B-B14F-4D97-AF65-F5344CB8AC3E}">
+        <p14:creationId xmlns:p14="http://schemas.microsoft.com/office/powerpoint/2010/main" val="560282884"/>
+      </p:ext>
+    </p:extLst>
+  </p:cSld>
+  <p:clrMapOvr>
+    <a:masterClrMapping/>
+  </p:clrMapOvr>
+</p:sld>
+</file>
+
+<file path=ppt/slides/slide31.xml><?xml version="1.0" encoding="utf-8"?>
+<p:sld xmlns:a="http://schemas.openxmlformats.org/drawingml/2006/main" xmlns:r="http://schemas.openxmlformats.org/officeDocument/2006/relationships" xmlns:p="http://schemas.openxmlformats.org/presentationml/2006/main">
+  <p:cSld>
+    <p:spTree>
+      <p:nvGrpSpPr>
+        <p:cNvPr id="1" name=""/>
+        <p:cNvGrpSpPr/>
+        <p:nvPr/>
+      </p:nvGrpSpPr>
+      <p:grpSpPr>
+        <a:xfrm>
+          <a:off x="0" y="0"/>
+          <a:ext cx="0" cy="0"/>
+          <a:chOff x="0" y="0"/>
+          <a:chExt cx="0" cy="0"/>
+        </a:xfrm>
+      </p:grpSpPr>
+      <p:sp>
+        <p:nvSpPr>
+          <p:cNvPr id="2" name="Titel 1"/>
+          <p:cNvSpPr>
+            <a:spLocks noGrp="1"/>
+          </p:cNvSpPr>
+          <p:nvPr>
+            <p:ph type="title"/>
+          </p:nvPr>
+        </p:nvSpPr>
+        <p:spPr/>
+        <p:txBody>
+          <a:bodyPr/>
+          <a:lstStyle/>
+          <a:p>
+            <a:r>
+              <a:rPr lang="de-DE"/>
+              <a:t>THX &amp; BYE</a:t>
+            </a:r>
+          </a:p>
+        </p:txBody>
+      </p:sp>
+      <p:sp>
+        <p:nvSpPr>
+          <p:cNvPr id="3" name="Inhaltsplatzhalter 2"/>
+          <p:cNvSpPr>
+            <a:spLocks noGrp="1"/>
+          </p:cNvSpPr>
+          <p:nvPr>
+            <p:ph idx="1"/>
+          </p:nvPr>
+        </p:nvSpPr>
+        <p:spPr/>
+        <p:txBody>
+          <a:bodyPr/>
+          <a:lstStyle/>
+          <a:p>
+            <a:endParaRPr lang="de-DE"/>
+          </a:p>
+        </p:txBody>
+      </p:sp>
+    </p:spTree>
+    <p:extLst>
+      <p:ext uri="{BB962C8B-B14F-4D97-AF65-F5344CB8AC3E}">
+        <p14:creationId xmlns:p14="http://schemas.microsoft.com/office/powerpoint/2010/main" val="2305008801"/>
       </p:ext>
     </p:extLst>
   </p:cSld>

</xml_diff>